<commit_message>
Added doxygen location and updated vector field comments.
</commit_message>
<xml_diff>
--- a/trunk/p1906-1-Field-Component-Update.pptx
+++ b/trunk/p1906-1-Field-Component-Update.pptx
@@ -6286,9 +6286,27 @@
             </a:r>
             <a:r>
               <a:rPr lang="en-US" dirty="0" smtClean="0"/>
-              <a:t>files will be created to imported into Mathematica and MATLAB</a:t>
-            </a:r>
-            <a:endParaRPr lang="en-US" dirty="0"/>
+              <a:t>files will be created to imported into Mathematica and </a:t>
+            </a:r>
+            <a:r>
+              <a:rPr lang="en-US" dirty="0" smtClean="0"/>
+              <a:t>MATLAB</a:t>
+            </a:r>
+          </a:p>
+          <a:p>
+            <a:pPr marL="514350" indent="-514350">
+              <a:buFont typeface="+mj-lt"/>
+              <a:buAutoNum type="arabicPeriod"/>
+            </a:pPr>
+            <a:r>
+              <a:rPr lang="en-US" dirty="0"/>
+              <a:t>See documentation in </a:t>
+            </a:r>
+            <a:r>
+              <a:rPr lang="en-US" u="sng" dirty="0"/>
+              <a:t>p1906/html/index.html</a:t>
+            </a:r>
+            <a:endParaRPr lang="en-US" u="sng" dirty="0"/>
           </a:p>
         </p:txBody>
       </p:sp>
@@ -7281,6 +7299,64 @@
               <a:t>Stephen F Bush (bushsf@research.ge.com)</a:t>
             </a:r>
             <a:endParaRPr lang="en-US" dirty="0"/>
+          </a:p>
+        </p:txBody>
+      </p:sp>
+      <p:sp>
+        <p:nvSpPr>
+          <p:cNvPr id="6" name="TextBox 5"/>
+          <p:cNvSpPr txBox="1"/>
+          <p:nvPr/>
+        </p:nvSpPr>
+        <p:spPr>
+          <a:xfrm>
+            <a:off x="155067" y="3111190"/>
+            <a:ext cx="3446777" cy="1384995"/>
+          </a:xfrm>
+          <a:prstGeom prst="rect">
+            <a:avLst/>
+          </a:prstGeom>
+          <a:noFill/>
+        </p:spPr>
+        <p:txBody>
+          <a:bodyPr wrap="square" rtlCol="0">
+            <a:spAutoFit/>
+          </a:bodyPr>
+          <a:lstStyle/>
+          <a:p>
+            <a:pPr marL="342900" indent="-342900">
+              <a:buAutoNum type="arabicPeriod"/>
+            </a:pPr>
+            <a:r>
+              <a:rPr lang="en-US" dirty="0" smtClean="0"/>
+              <a:t>Can be refined by using more samples</a:t>
+            </a:r>
+          </a:p>
+          <a:p>
+            <a:pPr marL="342900" indent="-342900">
+              <a:buAutoNum type="arabicPeriod"/>
+            </a:pPr>
+            <a:r>
+              <a:rPr lang="en-US" dirty="0" smtClean="0"/>
+              <a:t>Enables vector field analysis, e.g. </a:t>
+            </a:r>
+            <a:r>
+              <a:rPr lang="en-US" dirty="0" err="1" smtClean="0"/>
+              <a:t>Div</a:t>
+            </a:r>
+            <a:r>
+              <a:rPr lang="en-US" dirty="0" smtClean="0"/>
+              <a:t>, Curl, etc.</a:t>
+            </a:r>
+          </a:p>
+          <a:p>
+            <a:pPr marL="342900" indent="-342900">
+              <a:buAutoNum type="arabicPeriod"/>
+            </a:pPr>
+            <a:r>
+              <a:rPr lang="en-US" dirty="0" smtClean="0"/>
+              <a:t>May enable tensor and mechanical analysis</a:t>
+            </a:r>
           </a:p>
         </p:txBody>
       </p:sp>

</xml_diff>